<commit_message>
feat(seq3): enhanced ppt for map
</commit_message>
<xml_diff>
--- a/supports/source/03-Map.pptx
+++ b/supports/source/03-Map.pptx
@@ -7,9 +7,10 @@
   <p:sldIdLst>
     <p:sldId id="256" r:id="rId2"/>
     <p:sldId id="260" r:id="rId3"/>
-    <p:sldId id="261" r:id="rId4"/>
-    <p:sldId id="262" r:id="rId5"/>
-    <p:sldId id="263" r:id="rId6"/>
+    <p:sldId id="264" r:id="rId4"/>
+    <p:sldId id="261" r:id="rId5"/>
+    <p:sldId id="262" r:id="rId6"/>
+    <p:sldId id="263" r:id="rId7"/>
   </p:sldIdLst>
   <p:sldSz cx="12192000" cy="6858000"/>
   <p:notesSz cx="6858000" cy="9144000"/>
@@ -700,7 +701,7 @@
           <a:p>
             <a:fld id="{5AEE9901-D54F-483E-910A-A3C293F4A3A0}" type="datetimeFigureOut">
               <a:rPr lang="fr-CH" smtClean="0"/>
-              <a:t>10.09.2025</a:t>
+              <a:t>11.09.2025</a:t>
             </a:fld>
             <a:endParaRPr lang="fr-CH"/>
           </a:p>
@@ -987,7 +988,7 @@
           <a:p>
             <a:fld id="{5AEE9901-D54F-483E-910A-A3C293F4A3A0}" type="datetimeFigureOut">
               <a:rPr lang="fr-CH" smtClean="0"/>
-              <a:t>10.09.2025</a:t>
+              <a:t>11.09.2025</a:t>
             </a:fld>
             <a:endParaRPr lang="fr-CH"/>
           </a:p>
@@ -1179,7 +1180,7 @@
           <a:p>
             <a:fld id="{5AEE9901-D54F-483E-910A-A3C293F4A3A0}" type="datetimeFigureOut">
               <a:rPr lang="fr-CH" smtClean="0"/>
-              <a:t>10.09.2025</a:t>
+              <a:t>11.09.2025</a:t>
             </a:fld>
             <a:endParaRPr lang="fr-CH"/>
           </a:p>
@@ -1440,7 +1441,7 @@
           <a:p>
             <a:fld id="{5AEE9901-D54F-483E-910A-A3C293F4A3A0}" type="datetimeFigureOut">
               <a:rPr lang="fr-CH" smtClean="0"/>
-              <a:t>10.09.2025</a:t>
+              <a:t>11.09.2025</a:t>
             </a:fld>
             <a:endParaRPr lang="fr-CH"/>
           </a:p>
@@ -1864,7 +1865,7 @@
           <a:p>
             <a:fld id="{5AEE9901-D54F-483E-910A-A3C293F4A3A0}" type="datetimeFigureOut">
               <a:rPr lang="fr-CH" smtClean="0"/>
-              <a:t>10.09.2025</a:t>
+              <a:t>11.09.2025</a:t>
             </a:fld>
             <a:endParaRPr lang="fr-CH"/>
           </a:p>
@@ -2410,7 +2411,7 @@
           <a:p>
             <a:fld id="{5AEE9901-D54F-483E-910A-A3C293F4A3A0}" type="datetimeFigureOut">
               <a:rPr lang="fr-CH" smtClean="0"/>
-              <a:t>10.09.2025</a:t>
+              <a:t>11.09.2025</a:t>
             </a:fld>
             <a:endParaRPr lang="fr-CH"/>
           </a:p>
@@ -3250,7 +3251,7 @@
           <a:p>
             <a:fld id="{5AEE9901-D54F-483E-910A-A3C293F4A3A0}" type="datetimeFigureOut">
               <a:rPr lang="fr-CH" smtClean="0"/>
-              <a:t>10.09.2025</a:t>
+              <a:t>11.09.2025</a:t>
             </a:fld>
             <a:endParaRPr lang="fr-CH"/>
           </a:p>
@@ -3420,7 +3421,7 @@
           <a:p>
             <a:fld id="{5AEE9901-D54F-483E-910A-A3C293F4A3A0}" type="datetimeFigureOut">
               <a:rPr lang="fr-CH" smtClean="0"/>
-              <a:t>10.09.2025</a:t>
+              <a:t>11.09.2025</a:t>
             </a:fld>
             <a:endParaRPr lang="fr-CH"/>
           </a:p>
@@ -3604,7 +3605,7 @@
           <a:p>
             <a:fld id="{5AEE9901-D54F-483E-910A-A3C293F4A3A0}" type="datetimeFigureOut">
               <a:rPr lang="fr-CH" smtClean="0"/>
-              <a:t>10.09.2025</a:t>
+              <a:t>11.09.2025</a:t>
             </a:fld>
             <a:endParaRPr lang="fr-CH"/>
           </a:p>
@@ -3774,7 +3775,7 @@
           <a:p>
             <a:fld id="{5AEE9901-D54F-483E-910A-A3C293F4A3A0}" type="datetimeFigureOut">
               <a:rPr lang="fr-CH" smtClean="0"/>
-              <a:t>10.09.2025</a:t>
+              <a:t>11.09.2025</a:t>
             </a:fld>
             <a:endParaRPr lang="fr-CH"/>
           </a:p>
@@ -4022,7 +4023,7 @@
           <a:p>
             <a:fld id="{5AEE9901-D54F-483E-910A-A3C293F4A3A0}" type="datetimeFigureOut">
               <a:rPr lang="fr-CH" smtClean="0"/>
-              <a:t>10.09.2025</a:t>
+              <a:t>11.09.2025</a:t>
             </a:fld>
             <a:endParaRPr lang="fr-CH"/>
           </a:p>
@@ -4259,7 +4260,7 @@
           <a:p>
             <a:fld id="{5AEE9901-D54F-483E-910A-A3C293F4A3A0}" type="datetimeFigureOut">
               <a:rPr lang="fr-CH" smtClean="0"/>
-              <a:t>10.09.2025</a:t>
+              <a:t>11.09.2025</a:t>
             </a:fld>
             <a:endParaRPr lang="fr-CH"/>
           </a:p>
@@ -4632,7 +4633,7 @@
           <a:p>
             <a:fld id="{5AEE9901-D54F-483E-910A-A3C293F4A3A0}" type="datetimeFigureOut">
               <a:rPr lang="fr-CH" smtClean="0"/>
-              <a:t>10.09.2025</a:t>
+              <a:t>11.09.2025</a:t>
             </a:fld>
             <a:endParaRPr lang="fr-CH"/>
           </a:p>
@@ -4750,7 +4751,7 @@
           <a:p>
             <a:fld id="{5AEE9901-D54F-483E-910A-A3C293F4A3A0}" type="datetimeFigureOut">
               <a:rPr lang="fr-CH" smtClean="0"/>
-              <a:t>10.09.2025</a:t>
+              <a:t>11.09.2025</a:t>
             </a:fld>
             <a:endParaRPr lang="fr-CH"/>
           </a:p>
@@ -4845,7 +4846,7 @@
           <a:p>
             <a:fld id="{5AEE9901-D54F-483E-910A-A3C293F4A3A0}" type="datetimeFigureOut">
               <a:rPr lang="fr-CH" smtClean="0"/>
-              <a:t>10.09.2025</a:t>
+              <a:t>11.09.2025</a:t>
             </a:fld>
             <a:endParaRPr lang="fr-CH"/>
           </a:p>
@@ -5096,7 +5097,7 @@
           <a:p>
             <a:fld id="{5AEE9901-D54F-483E-910A-A3C293F4A3A0}" type="datetimeFigureOut">
               <a:rPr lang="fr-CH" smtClean="0"/>
-              <a:t>10.09.2025</a:t>
+              <a:t>11.09.2025</a:t>
             </a:fld>
             <a:endParaRPr lang="fr-CH"/>
           </a:p>
@@ -5383,7 +5384,7 @@
           <a:p>
             <a:fld id="{5AEE9901-D54F-483E-910A-A3C293F4A3A0}" type="datetimeFigureOut">
               <a:rPr lang="fr-CH" smtClean="0"/>
-              <a:t>10.09.2025</a:t>
+              <a:t>11.09.2025</a:t>
             </a:fld>
             <a:endParaRPr lang="fr-CH"/>
           </a:p>
@@ -5596,7 +5597,7 @@
           <a:p>
             <a:fld id="{5AEE9901-D54F-483E-910A-A3C293F4A3A0}" type="datetimeFigureOut">
               <a:rPr lang="fr-CH" smtClean="0"/>
-              <a:t>10.09.2025</a:t>
+              <a:t>11.09.2025</a:t>
             </a:fld>
             <a:endParaRPr lang="fr-CH"/>
           </a:p>
@@ -6180,7 +6181,12 @@
             <p:ph type="title"/>
           </p:nvPr>
         </p:nvSpPr>
-        <p:spPr/>
+        <p:spPr>
+          <a:xfrm>
+            <a:off x="913795" y="-50278"/>
+            <a:ext cx="10353761" cy="1326321"/>
+          </a:xfrm>
+        </p:spPr>
         <p:txBody>
           <a:bodyPr/>
           <a:lstStyle/>
@@ -6209,7 +6215,12 @@
             <p:ph idx="1"/>
           </p:nvPr>
         </p:nvSpPr>
-        <p:spPr/>
+        <p:spPr>
+          <a:xfrm>
+            <a:off x="913795" y="1115676"/>
+            <a:ext cx="10353762" cy="1674658"/>
+          </a:xfrm>
+        </p:spPr>
         <p:txBody>
           <a:bodyPr/>
           <a:lstStyle/>
@@ -6253,8 +6264,8 @@
         </p:nvSpPr>
         <p:spPr>
           <a:xfrm>
-            <a:off x="253094" y="3943632"/>
-            <a:ext cx="11666764" cy="2431435"/>
+            <a:off x="347362" y="2641272"/>
+            <a:ext cx="11666764" cy="4031873"/>
           </a:xfrm>
           <a:prstGeom prst="rect">
             <a:avLst/>
@@ -6281,7 +6292,7 @@
           <a:lstStyle/>
           <a:p>
             <a:r>
-              <a:rPr lang="fr-CH" sz="1400" dirty="0">
+              <a:rPr lang="fr-CH" sz="1600" dirty="0">
                 <a:solidFill>
                   <a:srgbClr val="0000FF"/>
                 </a:solidFill>
@@ -6290,7 +6301,7 @@
               <a:t>var</a:t>
             </a:r>
             <a:r>
-              <a:rPr lang="fr-CH" sz="1400" dirty="0">
+              <a:rPr lang="fr-CH" sz="1600" dirty="0">
                 <a:solidFill>
                   <a:srgbClr val="000000"/>
                 </a:solidFill>
@@ -6299,7 +6310,7 @@
               <a:t> </a:t>
             </a:r>
             <a:r>
-              <a:rPr lang="fr-CH" sz="1400" dirty="0" err="1">
+              <a:rPr lang="fr-CH" sz="1600" dirty="0" err="1">
                 <a:solidFill>
                   <a:srgbClr val="000000"/>
                 </a:solidFill>
@@ -6308,7 +6319,7 @@
               <a:t>numbers</a:t>
             </a:r>
             <a:r>
-              <a:rPr lang="fr-CH" sz="1400" dirty="0">
+              <a:rPr lang="fr-CH" sz="1600" dirty="0">
                 <a:solidFill>
                   <a:srgbClr val="000000"/>
                 </a:solidFill>
@@ -6317,7 +6328,7 @@
               <a:t> = </a:t>
             </a:r>
             <a:r>
-              <a:rPr lang="fr-CH" sz="1400" dirty="0" err="1">
+              <a:rPr lang="fr-CH" sz="1600" dirty="0" err="1">
                 <a:solidFill>
                   <a:srgbClr val="000000"/>
                 </a:solidFill>
@@ -6326,7 +6337,7 @@
               <a:t>Enumerable.Range</a:t>
             </a:r>
             <a:r>
-              <a:rPr lang="fr-CH" sz="1400" dirty="0">
+              <a:rPr lang="fr-CH" sz="1600" dirty="0">
                 <a:solidFill>
                   <a:srgbClr val="000000"/>
                 </a:solidFill>
@@ -6335,7 +6346,7 @@
               <a:t>(0, 5); </a:t>
             </a:r>
             <a:r>
-              <a:rPr lang="fr-CH" sz="1400" dirty="0">
+              <a:rPr lang="fr-CH" sz="1600" dirty="0">
                 <a:solidFill>
                   <a:srgbClr val="008000"/>
                 </a:solidFill>
@@ -6343,7 +6354,7 @@
               </a:rPr>
               <a:t>//0,1,2,3,4</a:t>
             </a:r>
-            <a:endParaRPr lang="fr-CH" sz="1400" dirty="0">
+            <a:endParaRPr lang="fr-CH" sz="1600" dirty="0">
               <a:solidFill>
                 <a:srgbClr val="000000"/>
               </a:solidFill>
@@ -6351,7 +6362,7 @@
             </a:endParaRPr>
           </a:p>
           <a:p>
-            <a:endParaRPr lang="fr-CH" sz="1400" dirty="0">
+            <a:endParaRPr lang="fr-CH" sz="1600" dirty="0">
               <a:solidFill>
                 <a:srgbClr val="000000"/>
               </a:solidFill>
@@ -6360,7 +6371,7 @@
           </a:p>
           <a:p>
             <a:r>
-              <a:rPr lang="en-US" sz="1400" dirty="0" err="1">
+              <a:rPr lang="en-US" sz="1600" dirty="0" err="1">
                 <a:solidFill>
                   <a:srgbClr val="000000"/>
                 </a:solidFill>
@@ -6369,7 +6380,7 @@
               <a:t>numbers.Select</a:t>
             </a:r>
             <a:r>
-              <a:rPr lang="en-US" sz="1400" dirty="0">
+              <a:rPr lang="en-US" sz="1600" dirty="0">
                 <a:solidFill>
                   <a:srgbClr val="000000"/>
                 </a:solidFill>
@@ -6377,8 +6388,10 @@
               </a:rPr>
               <a:t>(_ =&gt; 1).Print();</a:t>
             </a:r>
-            <a:r>
-              <a:rPr lang="en-US" sz="1400" dirty="0">
+          </a:p>
+          <a:p>
+            <a:r>
+              <a:rPr lang="en-US" sz="1600" dirty="0">
                 <a:solidFill>
                   <a:srgbClr val="008000"/>
                 </a:solidFill>
@@ -6386,7 +6399,7 @@
               </a:rPr>
               <a:t>//1,1,1,1,1</a:t>
             </a:r>
-            <a:endParaRPr lang="en-US" sz="1400" dirty="0">
+            <a:endParaRPr lang="en-US" sz="1600" dirty="0">
               <a:solidFill>
                 <a:srgbClr val="000000"/>
               </a:solidFill>
@@ -6394,7 +6407,7 @@
             </a:endParaRPr>
           </a:p>
           <a:p>
-            <a:endParaRPr lang="fr-CH" sz="1400" dirty="0">
+            <a:endParaRPr lang="fr-CH" sz="1600" dirty="0">
               <a:solidFill>
                 <a:srgbClr val="000000"/>
               </a:solidFill>
@@ -6403,7 +6416,7 @@
           </a:p>
           <a:p>
             <a:r>
-              <a:rPr lang="en-US" sz="1400" dirty="0" err="1">
+              <a:rPr lang="en-US" sz="1600" dirty="0" err="1">
                 <a:solidFill>
                   <a:srgbClr val="000000"/>
                 </a:solidFill>
@@ -6412,7 +6425,7 @@
               <a:t>numbers.Select</a:t>
             </a:r>
             <a:r>
-              <a:rPr lang="en-US" sz="1400" dirty="0">
+              <a:rPr lang="en-US" sz="1600" dirty="0">
                 <a:solidFill>
                   <a:srgbClr val="000000"/>
                 </a:solidFill>
@@ -6421,7 +6434,7 @@
               <a:t>(_ =&gt; </a:t>
             </a:r>
             <a:r>
-              <a:rPr lang="en-US" sz="1400" dirty="0">
+              <a:rPr lang="en-US" sz="1600" dirty="0">
                 <a:solidFill>
                   <a:srgbClr val="0000FF"/>
                 </a:solidFill>
@@ -6430,7 +6443,7 @@
               <a:t>new</a:t>
             </a:r>
             <a:r>
-              <a:rPr lang="en-US" sz="1400" dirty="0">
+              <a:rPr lang="en-US" sz="1600" dirty="0">
                 <a:solidFill>
                   <a:srgbClr val="000000"/>
                 </a:solidFill>
@@ -6438,8 +6451,10 @@
               </a:rPr>
               <a:t> Object()).Print();</a:t>
             </a:r>
-            <a:r>
-              <a:rPr lang="en-US" sz="1400" dirty="0">
+          </a:p>
+          <a:p>
+            <a:r>
+              <a:rPr lang="en-US" sz="1600" dirty="0">
                 <a:solidFill>
                   <a:srgbClr val="008000"/>
                 </a:solidFill>
@@ -6448,7 +6463,7 @@
               <a:t>//</a:t>
             </a:r>
             <a:r>
-              <a:rPr lang="en-US" sz="1400" dirty="0" err="1">
+              <a:rPr lang="en-US" sz="1600" dirty="0" err="1">
                 <a:solidFill>
                   <a:srgbClr val="008000"/>
                 </a:solidFill>
@@ -6456,7 +6471,7 @@
               </a:rPr>
               <a:t>object,object,object,object,object</a:t>
             </a:r>
-            <a:endParaRPr lang="en-US" sz="1400" dirty="0">
+            <a:endParaRPr lang="en-US" sz="1600" dirty="0">
               <a:solidFill>
                 <a:srgbClr val="000000"/>
               </a:solidFill>
@@ -6464,7 +6479,7 @@
             </a:endParaRPr>
           </a:p>
           <a:p>
-            <a:endParaRPr lang="fr-CH" sz="1400" dirty="0">
+            <a:endParaRPr lang="fr-CH" sz="1600" dirty="0">
               <a:solidFill>
                 <a:srgbClr val="000000"/>
               </a:solidFill>
@@ -6473,7 +6488,7 @@
           </a:p>
           <a:p>
             <a:r>
-              <a:rPr lang="en-US" sz="1400" dirty="0" err="1">
+              <a:rPr lang="en-US" sz="1600" dirty="0" err="1">
                 <a:solidFill>
                   <a:srgbClr val="000000"/>
                 </a:solidFill>
@@ -6482,7 +6497,7 @@
               <a:t>numbers.Select</a:t>
             </a:r>
             <a:r>
-              <a:rPr lang="en-US" sz="1400" dirty="0">
+              <a:rPr lang="en-US" sz="1600" dirty="0">
                 <a:solidFill>
                   <a:srgbClr val="000000"/>
                 </a:solidFill>
@@ -6491,7 +6506,7 @@
               <a:t>(number =&gt; </a:t>
             </a:r>
             <a:r>
-              <a:rPr lang="en-US" sz="1400" dirty="0">
+              <a:rPr lang="en-US" sz="1600" dirty="0">
                 <a:solidFill>
                   <a:srgbClr val="0000FF"/>
                 </a:solidFill>
@@ -6500,7 +6515,7 @@
               <a:t>new</a:t>
             </a:r>
             <a:r>
-              <a:rPr lang="en-US" sz="1400" dirty="0">
+              <a:rPr lang="en-US" sz="1600" dirty="0">
                 <a:solidFill>
                   <a:srgbClr val="000000"/>
                 </a:solidFill>
@@ -6509,7 +6524,7 @@
               <a:t> </a:t>
             </a:r>
             <a:r>
-              <a:rPr lang="en-US" sz="1400" dirty="0">
+              <a:rPr lang="en-US" sz="1600" dirty="0">
                 <a:solidFill>
                   <a:srgbClr val="0000FF"/>
                 </a:solidFill>
@@ -6518,7 +6533,7 @@
               <a:t>string</a:t>
             </a:r>
             <a:r>
-              <a:rPr lang="en-US" sz="1400" dirty="0">
+              <a:rPr lang="en-US" sz="1600" dirty="0">
                 <a:solidFill>
                   <a:srgbClr val="000000"/>
                 </a:solidFill>
@@ -6527,7 +6542,7 @@
               <a:t>(</a:t>
             </a:r>
             <a:r>
-              <a:rPr lang="en-US" sz="1400" dirty="0">
+              <a:rPr lang="en-US" sz="1600" dirty="0">
                 <a:solidFill>
                   <a:srgbClr val="A31515"/>
                 </a:solidFill>
@@ -6536,7 +6551,7 @@
               <a:t>'a'</a:t>
             </a:r>
             <a:r>
-              <a:rPr lang="en-US" sz="1400" dirty="0">
+              <a:rPr lang="en-US" sz="1600" dirty="0">
                 <a:solidFill>
                   <a:srgbClr val="000000"/>
                 </a:solidFill>
@@ -6544,8 +6559,10 @@
               </a:rPr>
               <a:t>, number)).Print();</a:t>
             </a:r>
-            <a:r>
-              <a:rPr lang="en-US" sz="1400" dirty="0">
+          </a:p>
+          <a:p>
+            <a:r>
+              <a:rPr lang="en-US" sz="1600" dirty="0">
                 <a:solidFill>
                   <a:srgbClr val="008000"/>
                 </a:solidFill>
@@ -6554,7 +6571,7 @@
               <a:t>//,</a:t>
             </a:r>
             <a:r>
-              <a:rPr lang="en-US" sz="1400" dirty="0" err="1">
+              <a:rPr lang="en-US" sz="1600" dirty="0" err="1">
                 <a:solidFill>
                   <a:srgbClr val="008000"/>
                 </a:solidFill>
@@ -6562,7 +6579,7 @@
               </a:rPr>
               <a:t>aa,aaa,aaaa,aaaaa</a:t>
             </a:r>
-            <a:endParaRPr lang="en-US" sz="1400" dirty="0">
+            <a:endParaRPr lang="en-US" sz="1600" dirty="0">
               <a:solidFill>
                 <a:srgbClr val="000000"/>
               </a:solidFill>
@@ -6570,7 +6587,7 @@
             </a:endParaRPr>
           </a:p>
           <a:p>
-            <a:endParaRPr lang="fr-CH" sz="1400" dirty="0">
+            <a:endParaRPr lang="fr-CH" sz="1600" dirty="0">
               <a:solidFill>
                 <a:srgbClr val="000000"/>
               </a:solidFill>
@@ -6579,7 +6596,7 @@
           </a:p>
           <a:p>
             <a:r>
-              <a:rPr lang="en-US" sz="1200" dirty="0" err="1">
+              <a:rPr lang="en-US" sz="1600" dirty="0" err="1">
                 <a:solidFill>
                   <a:srgbClr val="0000FF"/>
                 </a:solidFill>
@@ -6588,7 +6605,7 @@
               <a:t>string</a:t>
             </a:r>
             <a:r>
-              <a:rPr lang="en-US" sz="1200" dirty="0" err="1">
+              <a:rPr lang="en-US" sz="1600" dirty="0" err="1">
                 <a:solidFill>
                   <a:srgbClr val="000000"/>
                 </a:solidFill>
@@ -6597,7 +6614,7 @@
               <a:t>.Join</a:t>
             </a:r>
             <a:r>
-              <a:rPr lang="en-US" sz="1200" dirty="0">
+              <a:rPr lang="en-US" sz="1600" dirty="0">
                 <a:solidFill>
                   <a:srgbClr val="000000"/>
                 </a:solidFill>
@@ -6606,7 +6623,7 @@
               <a:t>(</a:t>
             </a:r>
             <a:r>
-              <a:rPr lang="en-US" sz="1200" dirty="0">
+              <a:rPr lang="en-US" sz="1600" dirty="0">
                 <a:solidFill>
                   <a:srgbClr val="A31515"/>
                 </a:solidFill>
@@ -6615,7 +6632,7 @@
               <a:t>','</a:t>
             </a:r>
             <a:r>
-              <a:rPr lang="en-US" sz="1200" dirty="0">
+              <a:rPr lang="en-US" sz="1600" dirty="0">
                 <a:solidFill>
                   <a:srgbClr val="000000"/>
                 </a:solidFill>
@@ -6623,8 +6640,10 @@
               </a:rPr>
               <a:t>, numbers).Select(character =&gt; Convert.ToInt32(character) + 1).Print();</a:t>
             </a:r>
-            <a:r>
-              <a:rPr lang="en-US" sz="1200" dirty="0">
+          </a:p>
+          <a:p>
+            <a:r>
+              <a:rPr lang="en-US" sz="1600" dirty="0">
                 <a:solidFill>
                   <a:srgbClr val="008000"/>
                 </a:solidFill>
@@ -6632,7 +6651,7 @@
               </a:rPr>
               <a:t>//49,45,50,45,51,45,52,45,53</a:t>
             </a:r>
-            <a:endParaRPr lang="en-US" sz="1200" dirty="0">
+            <a:endParaRPr lang="en-US" sz="1600" dirty="0">
               <a:solidFill>
                 <a:srgbClr val="000000"/>
               </a:solidFill>
@@ -6640,7 +6659,7 @@
             </a:endParaRPr>
           </a:p>
           <a:p>
-            <a:endParaRPr lang="fr-CH" sz="1400" dirty="0">
+            <a:endParaRPr lang="fr-CH" sz="1600" dirty="0">
               <a:solidFill>
                 <a:srgbClr val="000000"/>
               </a:solidFill>
@@ -6649,7 +6668,7 @@
           </a:p>
           <a:p>
             <a:r>
-              <a:rPr lang="fr-CH" sz="1400" dirty="0">
+              <a:rPr lang="fr-CH" sz="1600" dirty="0">
                 <a:solidFill>
                   <a:srgbClr val="A31515"/>
                 </a:solidFill>
@@ -6658,7 +6677,7 @@
               <a:t>""</a:t>
             </a:r>
             <a:r>
-              <a:rPr lang="fr-CH" sz="1400" dirty="0">
+              <a:rPr lang="fr-CH" sz="1600" dirty="0">
                 <a:solidFill>
                   <a:srgbClr val="000000"/>
                 </a:solidFill>
@@ -6667,7 +6686,7 @@
               <a:t>.Select(_ =&gt; </a:t>
             </a:r>
             <a:r>
-              <a:rPr lang="fr-CH" sz="1400" dirty="0" err="1">
+              <a:rPr lang="fr-CH" sz="1600" dirty="0" err="1">
                 <a:solidFill>
                   <a:srgbClr val="000000"/>
                 </a:solidFill>
@@ -6676,7 +6695,7 @@
               <a:t>Enumerable.Range</a:t>
             </a:r>
             <a:r>
-              <a:rPr lang="fr-CH" sz="1400" dirty="0">
+              <a:rPr lang="fr-CH" sz="1600" dirty="0">
                 <a:solidFill>
                   <a:srgbClr val="000000"/>
                 </a:solidFill>
@@ -6685,7 +6704,7 @@
               <a:t>(0, 5000)).</a:t>
             </a:r>
             <a:r>
-              <a:rPr lang="fr-CH" sz="1400" dirty="0" err="1">
+              <a:rPr lang="fr-CH" sz="1600" dirty="0" err="1">
                 <a:solidFill>
                   <a:srgbClr val="000000"/>
                 </a:solidFill>
@@ -6694,7 +6713,7 @@
               <a:t>Print</a:t>
             </a:r>
             <a:r>
-              <a:rPr lang="fr-CH" sz="1400" dirty="0">
+              <a:rPr lang="fr-CH" sz="1600" dirty="0">
                 <a:solidFill>
                   <a:srgbClr val="000000"/>
                 </a:solidFill>
@@ -6702,8 +6721,10 @@
               </a:rPr>
               <a:t>();</a:t>
             </a:r>
-            <a:r>
-              <a:rPr lang="fr-CH" sz="1400" dirty="0">
+          </a:p>
+          <a:p>
+            <a:r>
+              <a:rPr lang="fr-CH" sz="1600" dirty="0">
                 <a:solidFill>
                   <a:srgbClr val="008000"/>
                 </a:solidFill>
@@ -6711,7 +6732,7 @@
               </a:rPr>
               <a:t>// /!\PAS d’élément en entrée, PAS d’élément en sortie /!\</a:t>
             </a:r>
-            <a:endParaRPr lang="fr-CH" sz="1400" dirty="0"/>
+            <a:endParaRPr lang="fr-CH" sz="1600" dirty="0"/>
           </a:p>
         </p:txBody>
       </p:sp>
@@ -6880,6 +6901,693 @@
                       </p:childTnLst>
                     </p:cTn>
                   </p:par>
+                  <p:par>
+                    <p:cTn id="15" fill="hold">
+                      <p:stCondLst>
+                        <p:cond delay="indefinite"/>
+                      </p:stCondLst>
+                      <p:childTnLst>
+                        <p:par>
+                          <p:cTn id="16" fill="hold">
+                            <p:stCondLst>
+                              <p:cond delay="0"/>
+                            </p:stCondLst>
+                            <p:childTnLst>
+                              <p:par>
+                                <p:cTn id="17" presetID="1" presetClass="entr" presetSubtype="0" fill="hold" nodeType="clickEffect">
+                                  <p:stCondLst>
+                                    <p:cond delay="0"/>
+                                  </p:stCondLst>
+                                  <p:childTnLst>
+                                    <p:set>
+                                      <p:cBhvr>
+                                        <p:cTn id="18" dur="1" fill="hold">
+                                          <p:stCondLst>
+                                            <p:cond delay="0"/>
+                                          </p:stCondLst>
+                                        </p:cTn>
+                                        <p:tgtEl>
+                                          <p:spTgt spid="8">
+                                            <p:txEl>
+                                              <p:pRg st="0" end="0"/>
+                                            </p:txEl>
+                                          </p:spTgt>
+                                        </p:tgtEl>
+                                        <p:attrNameLst>
+                                          <p:attrName>style.visibility</p:attrName>
+                                        </p:attrNameLst>
+                                      </p:cBhvr>
+                                      <p:to>
+                                        <p:strVal val="visible"/>
+                                      </p:to>
+                                    </p:set>
+                                  </p:childTnLst>
+                                </p:cTn>
+                              </p:par>
+                            </p:childTnLst>
+                          </p:cTn>
+                        </p:par>
+                      </p:childTnLst>
+                    </p:cTn>
+                  </p:par>
+                  <p:par>
+                    <p:cTn id="19" fill="hold">
+                      <p:stCondLst>
+                        <p:cond delay="indefinite"/>
+                      </p:stCondLst>
+                      <p:childTnLst>
+                        <p:par>
+                          <p:cTn id="20" fill="hold">
+                            <p:stCondLst>
+                              <p:cond delay="0"/>
+                            </p:stCondLst>
+                            <p:childTnLst>
+                              <p:par>
+                                <p:cTn id="21" presetID="1" presetClass="entr" presetSubtype="0" fill="hold" nodeType="clickEffect">
+                                  <p:stCondLst>
+                                    <p:cond delay="0"/>
+                                  </p:stCondLst>
+                                  <p:iterate type="lt">
+                                    <p:tmAbs val="100"/>
+                                  </p:iterate>
+                                  <p:childTnLst>
+                                    <p:set>
+                                      <p:cBhvr>
+                                        <p:cTn id="22" dur="1" fill="hold">
+                                          <p:stCondLst>
+                                            <p:cond delay="0"/>
+                                          </p:stCondLst>
+                                        </p:cTn>
+                                        <p:tgtEl>
+                                          <p:spTgt spid="8">
+                                            <p:txEl>
+                                              <p:pRg st="2" end="2"/>
+                                            </p:txEl>
+                                          </p:spTgt>
+                                        </p:tgtEl>
+                                        <p:attrNameLst>
+                                          <p:attrName>style.visibility</p:attrName>
+                                        </p:attrNameLst>
+                                      </p:cBhvr>
+                                      <p:to>
+                                        <p:strVal val="visible"/>
+                                      </p:to>
+                                    </p:set>
+                                  </p:childTnLst>
+                                  <p:subTnLst>
+                                    <p:animClr clrSpc="rgb" dir="cw">
+                                      <p:cBhvr override="childStyle">
+                                        <p:cTn dur="1" fill="hold" display="0" masterRel="nextClick" afterEffect="1"/>
+                                        <p:tgtEl>
+                                          <p:spTgt spid="8">
+                                            <p:txEl>
+                                              <p:pRg st="2" end="2"/>
+                                            </p:txEl>
+                                          </p:spTgt>
+                                        </p:tgtEl>
+                                        <p:attrNameLst>
+                                          <p:attrName>ppt_c</p:attrName>
+                                        </p:attrNameLst>
+                                      </p:cBhvr>
+                                      <p:to>
+                                        <a:schemeClr val="bg2"/>
+                                      </p:to>
+                                    </p:animClr>
+                                  </p:subTnLst>
+                                </p:cTn>
+                              </p:par>
+                            </p:childTnLst>
+                          </p:cTn>
+                        </p:par>
+                      </p:childTnLst>
+                    </p:cTn>
+                  </p:par>
+                  <p:par>
+                    <p:cTn id="23" fill="hold">
+                      <p:stCondLst>
+                        <p:cond delay="indefinite"/>
+                      </p:stCondLst>
+                      <p:childTnLst>
+                        <p:par>
+                          <p:cTn id="24" fill="hold">
+                            <p:stCondLst>
+                              <p:cond delay="0"/>
+                            </p:stCondLst>
+                            <p:childTnLst>
+                              <p:par>
+                                <p:cTn id="25" presetID="1" presetClass="entr" presetSubtype="0" fill="hold" nodeType="clickEffect">
+                                  <p:stCondLst>
+                                    <p:cond delay="0"/>
+                                  </p:stCondLst>
+                                  <p:iterate type="lt">
+                                    <p:tmAbs val="100"/>
+                                  </p:iterate>
+                                  <p:childTnLst>
+                                    <p:set>
+                                      <p:cBhvr>
+                                        <p:cTn id="26" dur="1" fill="hold">
+                                          <p:stCondLst>
+                                            <p:cond delay="0"/>
+                                          </p:stCondLst>
+                                        </p:cTn>
+                                        <p:tgtEl>
+                                          <p:spTgt spid="8">
+                                            <p:txEl>
+                                              <p:pRg st="3" end="3"/>
+                                            </p:txEl>
+                                          </p:spTgt>
+                                        </p:tgtEl>
+                                        <p:attrNameLst>
+                                          <p:attrName>style.visibility</p:attrName>
+                                        </p:attrNameLst>
+                                      </p:cBhvr>
+                                      <p:to>
+                                        <p:strVal val="visible"/>
+                                      </p:to>
+                                    </p:set>
+                                  </p:childTnLst>
+                                </p:cTn>
+                              </p:par>
+                            </p:childTnLst>
+                          </p:cTn>
+                        </p:par>
+                      </p:childTnLst>
+                    </p:cTn>
+                  </p:par>
+                  <p:par>
+                    <p:cTn id="27" fill="hold">
+                      <p:stCondLst>
+                        <p:cond delay="indefinite"/>
+                      </p:stCondLst>
+                      <p:childTnLst>
+                        <p:par>
+                          <p:cTn id="28" fill="hold">
+                            <p:stCondLst>
+                              <p:cond delay="0"/>
+                            </p:stCondLst>
+                            <p:childTnLst>
+                              <p:par>
+                                <p:cTn id="29" presetID="1" presetClass="entr" presetSubtype="0" fill="hold" nodeType="clickEffect">
+                                  <p:stCondLst>
+                                    <p:cond delay="0"/>
+                                  </p:stCondLst>
+                                  <p:iterate type="lt">
+                                    <p:tmAbs val="100"/>
+                                  </p:iterate>
+                                  <p:childTnLst>
+                                    <p:set>
+                                      <p:cBhvr>
+                                        <p:cTn id="30" dur="1" fill="hold">
+                                          <p:stCondLst>
+                                            <p:cond delay="0"/>
+                                          </p:stCondLst>
+                                        </p:cTn>
+                                        <p:tgtEl>
+                                          <p:spTgt spid="8">
+                                            <p:txEl>
+                                              <p:pRg st="5" end="5"/>
+                                            </p:txEl>
+                                          </p:spTgt>
+                                        </p:tgtEl>
+                                        <p:attrNameLst>
+                                          <p:attrName>style.visibility</p:attrName>
+                                        </p:attrNameLst>
+                                      </p:cBhvr>
+                                      <p:to>
+                                        <p:strVal val="visible"/>
+                                      </p:to>
+                                    </p:set>
+                                  </p:childTnLst>
+                                  <p:subTnLst>
+                                    <p:animClr clrSpc="rgb" dir="cw">
+                                      <p:cBhvr override="childStyle">
+                                        <p:cTn dur="1" fill="hold" display="0" masterRel="nextClick" afterEffect="1"/>
+                                        <p:tgtEl>
+                                          <p:spTgt spid="8">
+                                            <p:txEl>
+                                              <p:pRg st="5" end="5"/>
+                                            </p:txEl>
+                                          </p:spTgt>
+                                        </p:tgtEl>
+                                        <p:attrNameLst>
+                                          <p:attrName>ppt_c</p:attrName>
+                                        </p:attrNameLst>
+                                      </p:cBhvr>
+                                      <p:to>
+                                        <a:schemeClr val="bg2"/>
+                                      </p:to>
+                                    </p:animClr>
+                                  </p:subTnLst>
+                                </p:cTn>
+                              </p:par>
+                            </p:childTnLst>
+                          </p:cTn>
+                        </p:par>
+                      </p:childTnLst>
+                    </p:cTn>
+                  </p:par>
+                  <p:par>
+                    <p:cTn id="31" fill="hold">
+                      <p:stCondLst>
+                        <p:cond delay="indefinite"/>
+                      </p:stCondLst>
+                      <p:childTnLst>
+                        <p:par>
+                          <p:cTn id="32" fill="hold">
+                            <p:stCondLst>
+                              <p:cond delay="0"/>
+                            </p:stCondLst>
+                            <p:childTnLst>
+                              <p:par>
+                                <p:cTn id="33" presetID="1" presetClass="entr" presetSubtype="0" fill="hold" nodeType="clickEffect">
+                                  <p:stCondLst>
+                                    <p:cond delay="0"/>
+                                  </p:stCondLst>
+                                  <p:iterate type="lt">
+                                    <p:tmAbs val="100"/>
+                                  </p:iterate>
+                                  <p:childTnLst>
+                                    <p:set>
+                                      <p:cBhvr>
+                                        <p:cTn id="34" dur="1" fill="hold">
+                                          <p:stCondLst>
+                                            <p:cond delay="0"/>
+                                          </p:stCondLst>
+                                        </p:cTn>
+                                        <p:tgtEl>
+                                          <p:spTgt spid="8">
+                                            <p:txEl>
+                                              <p:pRg st="6" end="6"/>
+                                            </p:txEl>
+                                          </p:spTgt>
+                                        </p:tgtEl>
+                                        <p:attrNameLst>
+                                          <p:attrName>style.visibility</p:attrName>
+                                        </p:attrNameLst>
+                                      </p:cBhvr>
+                                      <p:to>
+                                        <p:strVal val="visible"/>
+                                      </p:to>
+                                    </p:set>
+                                  </p:childTnLst>
+                                </p:cTn>
+                              </p:par>
+                            </p:childTnLst>
+                          </p:cTn>
+                        </p:par>
+                      </p:childTnLst>
+                    </p:cTn>
+                  </p:par>
+                  <p:par>
+                    <p:cTn id="35" fill="hold">
+                      <p:stCondLst>
+                        <p:cond delay="indefinite"/>
+                      </p:stCondLst>
+                      <p:childTnLst>
+                        <p:par>
+                          <p:cTn id="36" fill="hold">
+                            <p:stCondLst>
+                              <p:cond delay="0"/>
+                            </p:stCondLst>
+                            <p:childTnLst>
+                              <p:par>
+                                <p:cTn id="37" presetID="1" presetClass="entr" presetSubtype="0" fill="hold" nodeType="clickEffect">
+                                  <p:stCondLst>
+                                    <p:cond delay="0"/>
+                                  </p:stCondLst>
+                                  <p:iterate type="lt">
+                                    <p:tmAbs val="100"/>
+                                  </p:iterate>
+                                  <p:childTnLst>
+                                    <p:set>
+                                      <p:cBhvr>
+                                        <p:cTn id="38" dur="1" fill="hold">
+                                          <p:stCondLst>
+                                            <p:cond delay="0"/>
+                                          </p:stCondLst>
+                                        </p:cTn>
+                                        <p:tgtEl>
+                                          <p:spTgt spid="8">
+                                            <p:txEl>
+                                              <p:pRg st="8" end="8"/>
+                                            </p:txEl>
+                                          </p:spTgt>
+                                        </p:tgtEl>
+                                        <p:attrNameLst>
+                                          <p:attrName>style.visibility</p:attrName>
+                                        </p:attrNameLst>
+                                      </p:cBhvr>
+                                      <p:to>
+                                        <p:strVal val="visible"/>
+                                      </p:to>
+                                    </p:set>
+                                  </p:childTnLst>
+                                  <p:subTnLst>
+                                    <p:animClr clrSpc="rgb" dir="cw">
+                                      <p:cBhvr override="childStyle">
+                                        <p:cTn dur="1" fill="hold" display="0" masterRel="nextClick" afterEffect="1"/>
+                                        <p:tgtEl>
+                                          <p:spTgt spid="8">
+                                            <p:txEl>
+                                              <p:pRg st="8" end="8"/>
+                                            </p:txEl>
+                                          </p:spTgt>
+                                        </p:tgtEl>
+                                        <p:attrNameLst>
+                                          <p:attrName>ppt_c</p:attrName>
+                                        </p:attrNameLst>
+                                      </p:cBhvr>
+                                      <p:to>
+                                        <a:schemeClr val="bg2"/>
+                                      </p:to>
+                                    </p:animClr>
+                                  </p:subTnLst>
+                                </p:cTn>
+                              </p:par>
+                            </p:childTnLst>
+                          </p:cTn>
+                        </p:par>
+                      </p:childTnLst>
+                    </p:cTn>
+                  </p:par>
+                  <p:par>
+                    <p:cTn id="39" fill="hold">
+                      <p:stCondLst>
+                        <p:cond delay="indefinite"/>
+                      </p:stCondLst>
+                      <p:childTnLst>
+                        <p:par>
+                          <p:cTn id="40" fill="hold">
+                            <p:stCondLst>
+                              <p:cond delay="0"/>
+                            </p:stCondLst>
+                            <p:childTnLst>
+                              <p:par>
+                                <p:cTn id="41" presetID="1" presetClass="entr" presetSubtype="0" fill="hold" nodeType="clickEffect">
+                                  <p:stCondLst>
+                                    <p:cond delay="0"/>
+                                  </p:stCondLst>
+                                  <p:childTnLst>
+                                    <p:set>
+                                      <p:cBhvr>
+                                        <p:cTn id="42" dur="1" fill="hold">
+                                          <p:stCondLst>
+                                            <p:cond delay="0"/>
+                                          </p:stCondLst>
+                                        </p:cTn>
+                                        <p:tgtEl>
+                                          <p:spTgt spid="8">
+                                            <p:txEl>
+                                              <p:pRg st="9" end="9"/>
+                                            </p:txEl>
+                                          </p:spTgt>
+                                        </p:tgtEl>
+                                        <p:attrNameLst>
+                                          <p:attrName>style.visibility</p:attrName>
+                                        </p:attrNameLst>
+                                      </p:cBhvr>
+                                      <p:to>
+                                        <p:strVal val="visible"/>
+                                      </p:to>
+                                    </p:set>
+                                  </p:childTnLst>
+                                </p:cTn>
+                              </p:par>
+                            </p:childTnLst>
+                          </p:cTn>
+                        </p:par>
+                      </p:childTnLst>
+                    </p:cTn>
+                  </p:par>
+                  <p:par>
+                    <p:cTn id="43" fill="hold">
+                      <p:stCondLst>
+                        <p:cond delay="indefinite"/>
+                      </p:stCondLst>
+                      <p:childTnLst>
+                        <p:par>
+                          <p:cTn id="44" fill="hold">
+                            <p:stCondLst>
+                              <p:cond delay="0"/>
+                            </p:stCondLst>
+                            <p:childTnLst>
+                              <p:par>
+                                <p:cTn id="45" presetID="1" presetClass="entr" presetSubtype="0" fill="hold" nodeType="clickEffect">
+                                  <p:stCondLst>
+                                    <p:cond delay="0"/>
+                                  </p:stCondLst>
+                                  <p:iterate type="lt">
+                                    <p:tmAbs val="100"/>
+                                  </p:iterate>
+                                  <p:childTnLst>
+                                    <p:set>
+                                      <p:cBhvr>
+                                        <p:cTn id="46" dur="1" fill="hold">
+                                          <p:stCondLst>
+                                            <p:cond delay="0"/>
+                                          </p:stCondLst>
+                                        </p:cTn>
+                                        <p:tgtEl>
+                                          <p:spTgt spid="8">
+                                            <p:txEl>
+                                              <p:pRg st="11" end="11"/>
+                                            </p:txEl>
+                                          </p:spTgt>
+                                        </p:tgtEl>
+                                        <p:attrNameLst>
+                                          <p:attrName>style.visibility</p:attrName>
+                                        </p:attrNameLst>
+                                      </p:cBhvr>
+                                      <p:to>
+                                        <p:strVal val="visible"/>
+                                      </p:to>
+                                    </p:set>
+                                  </p:childTnLst>
+                                  <p:subTnLst>
+                                    <p:animClr clrSpc="rgb" dir="cw">
+                                      <p:cBhvr override="childStyle">
+                                        <p:cTn dur="1" fill="hold" display="0" masterRel="nextClick" afterEffect="1"/>
+                                        <p:tgtEl>
+                                          <p:spTgt spid="8">
+                                            <p:txEl>
+                                              <p:pRg st="11" end="11"/>
+                                            </p:txEl>
+                                          </p:spTgt>
+                                        </p:tgtEl>
+                                        <p:attrNameLst>
+                                          <p:attrName>ppt_c</p:attrName>
+                                        </p:attrNameLst>
+                                      </p:cBhvr>
+                                      <p:to>
+                                        <a:schemeClr val="bg2"/>
+                                      </p:to>
+                                    </p:animClr>
+                                  </p:subTnLst>
+                                </p:cTn>
+                              </p:par>
+                            </p:childTnLst>
+                          </p:cTn>
+                        </p:par>
+                      </p:childTnLst>
+                    </p:cTn>
+                  </p:par>
+                  <p:par>
+                    <p:cTn id="47" fill="hold">
+                      <p:stCondLst>
+                        <p:cond delay="indefinite"/>
+                      </p:stCondLst>
+                      <p:childTnLst>
+                        <p:par>
+                          <p:cTn id="48" fill="hold">
+                            <p:stCondLst>
+                              <p:cond delay="0"/>
+                            </p:stCondLst>
+                            <p:childTnLst>
+                              <p:par>
+                                <p:cTn id="49" presetID="10" presetClass="entr" presetSubtype="0" fill="hold" nodeType="clickEffect">
+                                  <p:stCondLst>
+                                    <p:cond delay="0"/>
+                                  </p:stCondLst>
+                                  <p:iterate type="lt">
+                                    <p:tmPct val="2000"/>
+                                  </p:iterate>
+                                  <p:childTnLst>
+                                    <p:set>
+                                      <p:cBhvr>
+                                        <p:cTn id="50" dur="1" fill="hold">
+                                          <p:stCondLst>
+                                            <p:cond delay="0"/>
+                                          </p:stCondLst>
+                                        </p:cTn>
+                                        <p:tgtEl>
+                                          <p:spTgt spid="8">
+                                            <p:txEl>
+                                              <p:pRg st="12" end="12"/>
+                                            </p:txEl>
+                                          </p:spTgt>
+                                        </p:tgtEl>
+                                        <p:attrNameLst>
+                                          <p:attrName>style.visibility</p:attrName>
+                                        </p:attrNameLst>
+                                      </p:cBhvr>
+                                      <p:to>
+                                        <p:strVal val="visible"/>
+                                      </p:to>
+                                    </p:set>
+                                    <p:animEffect transition="in" filter="fade">
+                                      <p:cBhvr>
+                                        <p:cTn id="51" dur="500"/>
+                                        <p:tgtEl>
+                                          <p:spTgt spid="8">
+                                            <p:txEl>
+                                              <p:pRg st="12" end="12"/>
+                                            </p:txEl>
+                                          </p:spTgt>
+                                        </p:tgtEl>
+                                      </p:cBhvr>
+                                    </p:animEffect>
+                                  </p:childTnLst>
+                                </p:cTn>
+                              </p:par>
+                            </p:childTnLst>
+                          </p:cTn>
+                        </p:par>
+                      </p:childTnLst>
+                    </p:cTn>
+                  </p:par>
+                  <p:par>
+                    <p:cTn id="52" fill="hold">
+                      <p:stCondLst>
+                        <p:cond delay="indefinite"/>
+                      </p:stCondLst>
+                      <p:childTnLst>
+                        <p:par>
+                          <p:cTn id="53" fill="hold">
+                            <p:stCondLst>
+                              <p:cond delay="0"/>
+                            </p:stCondLst>
+                            <p:childTnLst>
+                              <p:par>
+                                <p:cTn id="54" presetID="1" presetClass="entr" presetSubtype="0" fill="hold" nodeType="clickEffect">
+                                  <p:stCondLst>
+                                    <p:cond delay="0"/>
+                                  </p:stCondLst>
+                                  <p:iterate type="lt">
+                                    <p:tmAbs val="100"/>
+                                  </p:iterate>
+                                  <p:childTnLst>
+                                    <p:set>
+                                      <p:cBhvr>
+                                        <p:cTn id="55" dur="1" fill="hold">
+                                          <p:stCondLst>
+                                            <p:cond delay="0"/>
+                                          </p:stCondLst>
+                                        </p:cTn>
+                                        <p:tgtEl>
+                                          <p:spTgt spid="8">
+                                            <p:txEl>
+                                              <p:pRg st="14" end="14"/>
+                                            </p:txEl>
+                                          </p:spTgt>
+                                        </p:tgtEl>
+                                        <p:attrNameLst>
+                                          <p:attrName>style.visibility</p:attrName>
+                                        </p:attrNameLst>
+                                      </p:cBhvr>
+                                      <p:to>
+                                        <p:strVal val="visible"/>
+                                      </p:to>
+                                    </p:set>
+                                  </p:childTnLst>
+                                  <p:subTnLst>
+                                    <p:animClr clrSpc="rgb" dir="cw">
+                                      <p:cBhvr override="childStyle">
+                                        <p:cTn dur="1" fill="hold" display="0" masterRel="nextClick" afterEffect="1"/>
+                                        <p:tgtEl>
+                                          <p:spTgt spid="8">
+                                            <p:txEl>
+                                              <p:pRg st="14" end="14"/>
+                                            </p:txEl>
+                                          </p:spTgt>
+                                        </p:tgtEl>
+                                        <p:attrNameLst>
+                                          <p:attrName>ppt_c</p:attrName>
+                                        </p:attrNameLst>
+                                      </p:cBhvr>
+                                      <p:to>
+                                        <a:schemeClr val="bg2"/>
+                                      </p:to>
+                                    </p:animClr>
+                                  </p:subTnLst>
+                                </p:cTn>
+                              </p:par>
+                            </p:childTnLst>
+                          </p:cTn>
+                        </p:par>
+                      </p:childTnLst>
+                    </p:cTn>
+                  </p:par>
+                  <p:par>
+                    <p:cTn id="56" fill="hold">
+                      <p:stCondLst>
+                        <p:cond delay="indefinite"/>
+                      </p:stCondLst>
+                      <p:childTnLst>
+                        <p:par>
+                          <p:cTn id="57" fill="hold">
+                            <p:stCondLst>
+                              <p:cond delay="0"/>
+                            </p:stCondLst>
+                            <p:childTnLst>
+                              <p:par>
+                                <p:cTn id="58" presetID="10" presetClass="entr" presetSubtype="0" fill="hold" nodeType="clickEffect">
+                                  <p:stCondLst>
+                                    <p:cond delay="0"/>
+                                  </p:stCondLst>
+                                  <p:childTnLst>
+                                    <p:set>
+                                      <p:cBhvr>
+                                        <p:cTn id="59" dur="1" fill="hold">
+                                          <p:stCondLst>
+                                            <p:cond delay="0"/>
+                                          </p:stCondLst>
+                                        </p:cTn>
+                                        <p:tgtEl>
+                                          <p:spTgt spid="8">
+                                            <p:txEl>
+                                              <p:pRg st="15" end="15"/>
+                                            </p:txEl>
+                                          </p:spTgt>
+                                        </p:tgtEl>
+                                        <p:attrNameLst>
+                                          <p:attrName>style.visibility</p:attrName>
+                                        </p:attrNameLst>
+                                      </p:cBhvr>
+                                      <p:to>
+                                        <p:strVal val="visible"/>
+                                      </p:to>
+                                    </p:set>
+                                    <p:animEffect transition="in" filter="fade">
+                                      <p:cBhvr>
+                                        <p:cTn id="60" dur="500"/>
+                                        <p:tgtEl>
+                                          <p:spTgt spid="8">
+                                            <p:txEl>
+                                              <p:pRg st="15" end="15"/>
+                                            </p:txEl>
+                                          </p:spTgt>
+                                        </p:tgtEl>
+                                      </p:cBhvr>
+                                    </p:animEffect>
+                                  </p:childTnLst>
+                                </p:cTn>
+                              </p:par>
+                            </p:childTnLst>
+                          </p:cTn>
+                        </p:par>
+                      </p:childTnLst>
+                    </p:cTn>
+                  </p:par>
                 </p:childTnLst>
               </p:cTn>
               <p:prevCondLst>
@@ -6909,6 +7617,119 @@
 </file>
 
 <file path=ppt/slides/slide3.xml><?xml version="1.0" encoding="utf-8"?>
+<p:sld xmlns:a="http://schemas.openxmlformats.org/drawingml/2006/main" xmlns:r="http://schemas.openxmlformats.org/officeDocument/2006/relationships" xmlns:p="http://schemas.openxmlformats.org/presentationml/2006/main">
+  <p:cSld>
+    <p:spTree>
+      <p:nvGrpSpPr>
+        <p:cNvPr id="1" name=""/>
+        <p:cNvGrpSpPr/>
+        <p:nvPr/>
+      </p:nvGrpSpPr>
+      <p:grpSpPr>
+        <a:xfrm>
+          <a:off x="0" y="0"/>
+          <a:ext cx="0" cy="0"/>
+          <a:chOff x="0" y="0"/>
+          <a:chExt cx="0" cy="0"/>
+        </a:xfrm>
+      </p:grpSpPr>
+      <p:sp>
+        <p:nvSpPr>
+          <p:cNvPr id="2" name="Titre 1">
+            <a:extLst>
+              <a:ext uri="{FF2B5EF4-FFF2-40B4-BE49-F238E27FC236}">
+                <a16:creationId xmlns:a16="http://schemas.microsoft.com/office/drawing/2014/main" id="{5D899F89-4AD3-D526-AB70-6554B85A47C7}"/>
+              </a:ext>
+            </a:extLst>
+          </p:cNvPr>
+          <p:cNvSpPr>
+            <a:spLocks noGrp="1"/>
+          </p:cNvSpPr>
+          <p:nvPr>
+            <p:ph type="title"/>
+          </p:nvPr>
+        </p:nvSpPr>
+        <p:spPr/>
+        <p:txBody>
+          <a:bodyPr/>
+          <a:lstStyle/>
+          <a:p>
+            <a:r>
+              <a:rPr lang="fr-CH" dirty="0"/>
+              <a:t>Signature d'une fonction de mapping ?</a:t>
+            </a:r>
+          </a:p>
+        </p:txBody>
+      </p:sp>
+      <p:sp>
+        <p:nvSpPr>
+          <p:cNvPr id="3" name="Espace réservé du contenu 2">
+            <a:extLst>
+              <a:ext uri="{FF2B5EF4-FFF2-40B4-BE49-F238E27FC236}">
+                <a16:creationId xmlns:a16="http://schemas.microsoft.com/office/drawing/2014/main" id="{C9CFA16B-8702-B540-CA3E-9C07B3069340}"/>
+              </a:ext>
+            </a:extLst>
+          </p:cNvPr>
+          <p:cNvSpPr>
+            <a:spLocks noGrp="1"/>
+          </p:cNvSpPr>
+          <p:nvPr>
+            <p:ph idx="1"/>
+          </p:nvPr>
+        </p:nvSpPr>
+        <p:spPr/>
+        <p:txBody>
+          <a:bodyPr/>
+          <a:lstStyle/>
+          <a:p>
+            <a:r>
+              <a:rPr lang="fr-CH" dirty="0"/>
+              <a:t>Action ?</a:t>
+            </a:r>
+          </a:p>
+          <a:p>
+            <a:r>
+              <a:rPr lang="fr-CH" dirty="0" err="1"/>
+              <a:t>Func</a:t>
+            </a:r>
+            <a:r>
+              <a:rPr lang="fr-CH" dirty="0"/>
+              <a:t> ?</a:t>
+            </a:r>
+          </a:p>
+          <a:p>
+            <a:endParaRPr lang="fr-CH" dirty="0"/>
+          </a:p>
+          <a:p>
+            <a:r>
+              <a:rPr lang="fr-CH" sz="3200" b="1" dirty="0"/>
+              <a:t>FUNC&lt;</a:t>
+            </a:r>
+            <a:r>
+              <a:rPr lang="fr-CH" sz="3200" b="1" dirty="0" err="1"/>
+              <a:t>InputElementType,OutputElementType</a:t>
+            </a:r>
+            <a:r>
+              <a:rPr lang="fr-CH" sz="3200" b="1" dirty="0"/>
+              <a:t>&gt;</a:t>
+            </a:r>
+          </a:p>
+        </p:txBody>
+      </p:sp>
+    </p:spTree>
+    <p:extLst>
+      <p:ext uri="{BB962C8B-B14F-4D97-AF65-F5344CB8AC3E}">
+        <p14:creationId xmlns:p14="http://schemas.microsoft.com/office/powerpoint/2010/main" val="2026695703"/>
+      </p:ext>
+    </p:extLst>
+  </p:cSld>
+  <p:clrMapOvr>
+    <a:masterClrMapping/>
+  </p:clrMapOvr>
+</p:sld>
+</file>
+
+<file path=ppt/slides/slide4.xml><?xml version="1.0" encoding="utf-8"?>
 <p:sld xmlns:a="http://schemas.openxmlformats.org/drawingml/2006/main" xmlns:r="http://schemas.openxmlformats.org/officeDocument/2006/relationships" xmlns:p="http://schemas.openxmlformats.org/presentationml/2006/main">
   <p:cSld>
     <p:spTree>
@@ -7565,7 +8386,7 @@
 </p:sld>
 </file>
 
-<file path=ppt/slides/slide4.xml><?xml version="1.0" encoding="utf-8"?>
+<file path=ppt/slides/slide5.xml><?xml version="1.0" encoding="utf-8"?>
 <p:sld xmlns:a="http://schemas.openxmlformats.org/drawingml/2006/main" xmlns:r="http://schemas.openxmlformats.org/officeDocument/2006/relationships" xmlns:p="http://schemas.openxmlformats.org/presentationml/2006/main">
   <p:cSld>
     <p:spTree>
@@ -7610,7 +8431,7 @@
           <a:p>
             <a:r>
               <a:rPr lang="fr-CH" dirty="0"/>
-              <a:t>Étendue des possibilités</a:t>
+              <a:t>Options pour "contenir" les données</a:t>
             </a:r>
           </a:p>
         </p:txBody>
@@ -8729,7 +9550,7 @@
 </p:sld>
 </file>
 
-<file path=ppt/slides/slide5.xml><?xml version="1.0" encoding="utf-8"?>
+<file path=ppt/slides/slide6.xml><?xml version="1.0" encoding="utf-8"?>
 <p:sld xmlns:a="http://schemas.openxmlformats.org/drawingml/2006/main" xmlns:r="http://schemas.openxmlformats.org/officeDocument/2006/relationships" xmlns:p="http://schemas.openxmlformats.org/presentationml/2006/main">
   <p:cSld>
     <p:spTree>

</xml_diff>